<commit_message>
modify the figure of structure
</commit_message>
<xml_diff>
--- a/doc/struction.pptx
+++ b/doc/struction.pptx
@@ -295,7 +295,7 @@
             <a:fld id="{530820CF-B880-4189-942D-D702A7CBA730}" type="datetimeFigureOut">
               <a:rPr lang="zh-CN" altLang="en-US" smtClean="0"/>
               <a:pPr/>
-              <a:t>2018/4/9 Monday</a:t>
+              <a:t>2018/4/10 Tuesday</a:t>
             </a:fld>
             <a:endParaRPr lang="zh-CN" altLang="en-US"/>
           </a:p>
@@ -462,7 +462,7 @@
             <a:fld id="{530820CF-B880-4189-942D-D702A7CBA730}" type="datetimeFigureOut">
               <a:rPr lang="zh-CN" altLang="en-US" smtClean="0"/>
               <a:pPr/>
-              <a:t>2018/4/9 Monday</a:t>
+              <a:t>2018/4/10 Tuesday</a:t>
             </a:fld>
             <a:endParaRPr lang="zh-CN" altLang="en-US"/>
           </a:p>
@@ -639,7 +639,7 @@
             <a:fld id="{530820CF-B880-4189-942D-D702A7CBA730}" type="datetimeFigureOut">
               <a:rPr lang="zh-CN" altLang="en-US" smtClean="0"/>
               <a:pPr/>
-              <a:t>2018/4/9 Monday</a:t>
+              <a:t>2018/4/10 Tuesday</a:t>
             </a:fld>
             <a:endParaRPr lang="zh-CN" altLang="en-US"/>
           </a:p>
@@ -806,7 +806,7 @@
             <a:fld id="{530820CF-B880-4189-942D-D702A7CBA730}" type="datetimeFigureOut">
               <a:rPr lang="zh-CN" altLang="en-US" smtClean="0"/>
               <a:pPr/>
-              <a:t>2018/4/9 Monday</a:t>
+              <a:t>2018/4/10 Tuesday</a:t>
             </a:fld>
             <a:endParaRPr lang="zh-CN" altLang="en-US"/>
           </a:p>
@@ -1049,7 +1049,7 @@
             <a:fld id="{530820CF-B880-4189-942D-D702A7CBA730}" type="datetimeFigureOut">
               <a:rPr lang="zh-CN" altLang="en-US" smtClean="0"/>
               <a:pPr/>
-              <a:t>2018/4/9 Monday</a:t>
+              <a:t>2018/4/10 Tuesday</a:t>
             </a:fld>
             <a:endParaRPr lang="zh-CN" altLang="en-US"/>
           </a:p>
@@ -1334,7 +1334,7 @@
             <a:fld id="{530820CF-B880-4189-942D-D702A7CBA730}" type="datetimeFigureOut">
               <a:rPr lang="zh-CN" altLang="en-US" smtClean="0"/>
               <a:pPr/>
-              <a:t>2018/4/9 Monday</a:t>
+              <a:t>2018/4/10 Tuesday</a:t>
             </a:fld>
             <a:endParaRPr lang="zh-CN" altLang="en-US"/>
           </a:p>
@@ -1753,7 +1753,7 @@
             <a:fld id="{530820CF-B880-4189-942D-D702A7CBA730}" type="datetimeFigureOut">
               <a:rPr lang="zh-CN" altLang="en-US" smtClean="0"/>
               <a:pPr/>
-              <a:t>2018/4/9 Monday</a:t>
+              <a:t>2018/4/10 Tuesday</a:t>
             </a:fld>
             <a:endParaRPr lang="zh-CN" altLang="en-US"/>
           </a:p>
@@ -1868,7 +1868,7 @@
             <a:fld id="{530820CF-B880-4189-942D-D702A7CBA730}" type="datetimeFigureOut">
               <a:rPr lang="zh-CN" altLang="en-US" smtClean="0"/>
               <a:pPr/>
-              <a:t>2018/4/9 Monday</a:t>
+              <a:t>2018/4/10 Tuesday</a:t>
             </a:fld>
             <a:endParaRPr lang="zh-CN" altLang="en-US"/>
           </a:p>
@@ -1960,7 +1960,7 @@
             <a:fld id="{530820CF-B880-4189-942D-D702A7CBA730}" type="datetimeFigureOut">
               <a:rPr lang="zh-CN" altLang="en-US" smtClean="0"/>
               <a:pPr/>
-              <a:t>2018/4/9 Monday</a:t>
+              <a:t>2018/4/10 Tuesday</a:t>
             </a:fld>
             <a:endParaRPr lang="zh-CN" altLang="en-US"/>
           </a:p>
@@ -2234,7 +2234,7 @@
             <a:fld id="{530820CF-B880-4189-942D-D702A7CBA730}" type="datetimeFigureOut">
               <a:rPr lang="zh-CN" altLang="en-US" smtClean="0"/>
               <a:pPr/>
-              <a:t>2018/4/9 Monday</a:t>
+              <a:t>2018/4/10 Tuesday</a:t>
             </a:fld>
             <a:endParaRPr lang="zh-CN" altLang="en-US"/>
           </a:p>
@@ -2484,7 +2484,7 @@
             <a:fld id="{530820CF-B880-4189-942D-D702A7CBA730}" type="datetimeFigureOut">
               <a:rPr lang="zh-CN" altLang="en-US" smtClean="0"/>
               <a:pPr/>
-              <a:t>2018/4/9 Monday</a:t>
+              <a:t>2018/4/10 Tuesday</a:t>
             </a:fld>
             <a:endParaRPr lang="zh-CN" altLang="en-US"/>
           </a:p>
@@ -2694,7 +2694,7 @@
             <a:fld id="{530820CF-B880-4189-942D-D702A7CBA730}" type="datetimeFigureOut">
               <a:rPr lang="zh-CN" altLang="en-US" smtClean="0"/>
               <a:pPr/>
-              <a:t>2018/4/9 Monday</a:t>
+              <a:t>2018/4/10 Tuesday</a:t>
             </a:fld>
             <a:endParaRPr lang="zh-CN" altLang="en-US"/>
           </a:p>
@@ -3151,7 +3151,7 @@
         </p:nvCxnSpPr>
         <p:spPr>
           <a:xfrm>
-            <a:off x="2219143" y="2960957"/>
+            <a:off x="2219143" y="3461878"/>
             <a:ext cx="296069" cy="1344"/>
           </a:xfrm>
           <a:prstGeom prst="straightConnector1">
@@ -3189,7 +3189,7 @@
         </p:nvCxnSpPr>
         <p:spPr>
           <a:xfrm>
-            <a:off x="3344207" y="2960957"/>
+            <a:off x="3344207" y="3461878"/>
             <a:ext cx="236856" cy="1344"/>
           </a:xfrm>
           <a:prstGeom prst="straightConnector1">
@@ -3227,7 +3227,7 @@
         </p:nvCxnSpPr>
         <p:spPr>
           <a:xfrm>
-            <a:off x="3344207" y="1932790"/>
+            <a:off x="3344207" y="2433711"/>
             <a:ext cx="236856" cy="1344"/>
           </a:xfrm>
           <a:prstGeom prst="straightConnector1">
@@ -3832,7 +3832,7 @@
         </p:nvSpPr>
         <p:spPr>
           <a:xfrm>
-            <a:off x="2515213" y="2779516"/>
+            <a:off x="2515213" y="3280437"/>
             <a:ext cx="828994" cy="362883"/>
           </a:xfrm>
           <a:prstGeom prst="rect">
@@ -3874,7 +3874,7 @@
         </p:nvSpPr>
         <p:spPr>
           <a:xfrm>
-            <a:off x="2515213" y="1509427"/>
+            <a:off x="2515213" y="2010348"/>
             <a:ext cx="828994" cy="967687"/>
           </a:xfrm>
           <a:prstGeom prst="rect">
@@ -3916,7 +3916,7 @@
         </p:nvSpPr>
         <p:spPr>
           <a:xfrm>
-            <a:off x="945392" y="903278"/>
+            <a:off x="945392" y="857238"/>
             <a:ext cx="546311" cy="234511"/>
           </a:xfrm>
           <a:prstGeom prst="rect">
@@ -3946,7 +3946,7 @@
         </p:nvSpPr>
         <p:spPr>
           <a:xfrm>
-            <a:off x="2544166" y="903278"/>
+            <a:off x="2544166" y="857238"/>
             <a:ext cx="566241" cy="234511"/>
           </a:xfrm>
           <a:prstGeom prst="rect">
@@ -3976,7 +3976,7 @@
         </p:nvSpPr>
         <p:spPr>
           <a:xfrm>
-            <a:off x="4363402" y="903278"/>
+            <a:off x="4363402" y="857238"/>
             <a:ext cx="584843" cy="234511"/>
           </a:xfrm>
           <a:prstGeom prst="rect">
@@ -4006,7 +4006,7 @@
         </p:nvSpPr>
         <p:spPr>
           <a:xfrm>
-            <a:off x="6037785" y="903278"/>
+            <a:off x="6037785" y="857238"/>
             <a:ext cx="736315" cy="234511"/>
           </a:xfrm>
           <a:prstGeom prst="rect">
@@ -4036,7 +4036,7 @@
         </p:nvSpPr>
         <p:spPr>
           <a:xfrm>
-            <a:off x="7577346" y="903278"/>
+            <a:off x="7577346" y="857238"/>
             <a:ext cx="637991" cy="234511"/>
           </a:xfrm>
           <a:prstGeom prst="rect">
@@ -4228,7 +4228,7 @@
         </p:nvCxnSpPr>
         <p:spPr>
           <a:xfrm rot="5400000" flipH="1" flipV="1">
-            <a:off x="2778509" y="2628329"/>
+            <a:off x="2778509" y="3129250"/>
             <a:ext cx="302402" cy="1316"/>
           </a:xfrm>
           <a:prstGeom prst="straightConnector1">
@@ -4531,8 +4531,8 @@
         </p:nvCxnSpPr>
         <p:spPr>
           <a:xfrm rot="5400000" flipH="1" flipV="1">
-            <a:off x="7482180" y="1630395"/>
-            <a:ext cx="605477" cy="658"/>
+            <a:off x="7390415" y="1537166"/>
+            <a:ext cx="790473" cy="2122"/>
           </a:xfrm>
           <a:prstGeom prst="line">
             <a:avLst/>
@@ -4567,9 +4567,9 @@
           <p:nvPr/>
         </p:nvCxnSpPr>
         <p:spPr>
-          <a:xfrm rot="10800000" flipV="1">
-            <a:off x="2337571" y="1327984"/>
-            <a:ext cx="5447677" cy="1"/>
+          <a:xfrm rot="10800000">
+            <a:off x="2285985" y="1142991"/>
+            <a:ext cx="5499265" cy="19051"/>
           </a:xfrm>
           <a:prstGeom prst="line">
             <a:avLst/>
@@ -4605,8 +4605,8 @@
         </p:nvCxnSpPr>
         <p:spPr>
           <a:xfrm rot="16200000" flipH="1">
-            <a:off x="2005264" y="1660963"/>
-            <a:ext cx="664614" cy="3"/>
+            <a:off x="1607322" y="1821652"/>
+            <a:ext cx="1357322" cy="1"/>
           </a:xfrm>
           <a:prstGeom prst="line">
             <a:avLst/>
@@ -4643,9 +4643,9 @@
           <p:nvPr/>
         </p:nvCxnSpPr>
         <p:spPr>
-          <a:xfrm>
-            <a:off x="2337571" y="1993270"/>
-            <a:ext cx="177642" cy="1344"/>
+          <a:xfrm flipV="1">
+            <a:off x="2285984" y="2494192"/>
+            <a:ext cx="229229" cy="6120"/>
           </a:xfrm>
           <a:prstGeom prst="straightConnector1">
             <a:avLst/>
@@ -4674,6 +4674,645 @@
           </a:fontRef>
         </p:style>
       </p:cxnSp>
+      <p:sp>
+        <p:nvSpPr>
+          <p:cNvPr id="54" name="矩形 53"/>
+          <p:cNvSpPr/>
+          <p:nvPr/>
+        </p:nvSpPr>
+        <p:spPr>
+          <a:xfrm>
+            <a:off x="2469818" y="1357304"/>
+            <a:ext cx="928694" cy="362883"/>
+          </a:xfrm>
+          <a:prstGeom prst="rect">
+            <a:avLst/>
+          </a:prstGeom>
+        </p:spPr>
+        <p:style>
+          <a:lnRef idx="3">
+            <a:schemeClr val="lt1"/>
+          </a:lnRef>
+          <a:fillRef idx="1">
+            <a:schemeClr val="accent2"/>
+          </a:fillRef>
+          <a:effectRef idx="1">
+            <a:schemeClr val="accent2"/>
+          </a:effectRef>
+          <a:fontRef idx="minor">
+            <a:schemeClr val="lt1"/>
+          </a:fontRef>
+        </p:style>
+        <p:txBody>
+          <a:bodyPr rtlCol="0" anchor="ctr"/>
+          <a:lstStyle/>
+          <a:p>
+            <a:pPr algn="ctr"/>
+            <a:r>
+              <a:rPr lang="en-US" altLang="zh-CN" sz="1050" b="1" dirty="0" err="1" smtClean="0"/>
+              <a:t>BraDecoder</a:t>
+            </a:r>
+            <a:endParaRPr lang="zh-CN" altLang="en-US" sz="1050" b="1" dirty="0"/>
+          </a:p>
+        </p:txBody>
+      </p:sp>
+      <p:cxnSp>
+        <p:nvCxnSpPr>
+          <p:cNvPr id="56" name="直接箭头连接符 55"/>
+          <p:cNvCxnSpPr/>
+          <p:nvPr/>
+        </p:nvCxnSpPr>
+        <p:spPr>
+          <a:xfrm rot="5400000" flipH="1" flipV="1">
+            <a:off x="2778383" y="1865037"/>
+            <a:ext cx="302402" cy="1316"/>
+          </a:xfrm>
+          <a:prstGeom prst="straightConnector1">
+            <a:avLst/>
+          </a:prstGeom>
+          <a:ln>
+            <a:solidFill>
+              <a:schemeClr val="bg1">
+                <a:lumMod val="50000"/>
+              </a:schemeClr>
+            </a:solidFill>
+            <a:tailEnd type="arrow"/>
+          </a:ln>
+        </p:spPr>
+        <p:style>
+          <a:lnRef idx="3">
+            <a:schemeClr val="dk1"/>
+          </a:lnRef>
+          <a:fillRef idx="0">
+            <a:schemeClr val="dk1"/>
+          </a:fillRef>
+          <a:effectRef idx="2">
+            <a:schemeClr val="dk1"/>
+          </a:effectRef>
+          <a:fontRef idx="minor">
+            <a:schemeClr val="tx1"/>
+          </a:fontRef>
+        </p:style>
+      </p:cxnSp>
+      <p:sp>
+        <p:nvSpPr>
+          <p:cNvPr id="57" name="矩形 56"/>
+          <p:cNvSpPr/>
+          <p:nvPr/>
+        </p:nvSpPr>
+        <p:spPr>
+          <a:xfrm>
+            <a:off x="571472" y="1357304"/>
+            <a:ext cx="214314" cy="610497"/>
+          </a:xfrm>
+          <a:prstGeom prst="rect">
+            <a:avLst/>
+          </a:prstGeom>
+        </p:spPr>
+        <p:style>
+          <a:lnRef idx="3">
+            <a:schemeClr val="lt1"/>
+          </a:lnRef>
+          <a:fillRef idx="1">
+            <a:schemeClr val="accent2"/>
+          </a:fillRef>
+          <a:effectRef idx="1">
+            <a:schemeClr val="accent2"/>
+          </a:effectRef>
+          <a:fontRef idx="minor">
+            <a:schemeClr val="lt1"/>
+          </a:fontRef>
+        </p:style>
+        <p:txBody>
+          <a:bodyPr rtlCol="0" anchor="ctr"/>
+          <a:lstStyle/>
+          <a:p>
+            <a:pPr algn="ctr"/>
+            <a:r>
+              <a:rPr lang="en-US" altLang="zh-CN" sz="1050" dirty="0" smtClean="0"/>
+              <a:t>MUX</a:t>
+            </a:r>
+            <a:endParaRPr lang="zh-CN" altLang="en-US" sz="1050" dirty="0"/>
+          </a:p>
+        </p:txBody>
+      </p:sp>
+      <p:cxnSp>
+        <p:nvCxnSpPr>
+          <p:cNvPr id="60" name="直接连接符 59"/>
+          <p:cNvCxnSpPr/>
+          <p:nvPr/>
+        </p:nvCxnSpPr>
+        <p:spPr>
+          <a:xfrm rot="5400000">
+            <a:off x="1250133" y="2035965"/>
+            <a:ext cx="214314" cy="1588"/>
+          </a:xfrm>
+          <a:prstGeom prst="line">
+            <a:avLst/>
+          </a:prstGeom>
+        </p:spPr>
+        <p:style>
+          <a:lnRef idx="1">
+            <a:schemeClr val="accent1"/>
+          </a:lnRef>
+          <a:fillRef idx="0">
+            <a:schemeClr val="accent1"/>
+          </a:fillRef>
+          <a:effectRef idx="0">
+            <a:schemeClr val="accent1"/>
+          </a:effectRef>
+          <a:fontRef idx="minor">
+            <a:schemeClr val="tx1"/>
+          </a:fontRef>
+        </p:style>
+      </p:cxnSp>
+      <p:cxnSp>
+        <p:nvCxnSpPr>
+          <p:cNvPr id="63" name="直接连接符 62"/>
+          <p:cNvCxnSpPr/>
+          <p:nvPr/>
+        </p:nvCxnSpPr>
+        <p:spPr>
+          <a:xfrm rot="10800000">
+            <a:off x="357158" y="2143122"/>
+            <a:ext cx="1000132" cy="1588"/>
+          </a:xfrm>
+          <a:prstGeom prst="line">
+            <a:avLst/>
+          </a:prstGeom>
+        </p:spPr>
+        <p:style>
+          <a:lnRef idx="1">
+            <a:schemeClr val="accent1"/>
+          </a:lnRef>
+          <a:fillRef idx="0">
+            <a:schemeClr val="accent1"/>
+          </a:fillRef>
+          <a:effectRef idx="0">
+            <a:schemeClr val="accent1"/>
+          </a:effectRef>
+          <a:fontRef idx="minor">
+            <a:schemeClr val="tx1"/>
+          </a:fontRef>
+        </p:style>
+      </p:cxnSp>
+      <p:cxnSp>
+        <p:nvCxnSpPr>
+          <p:cNvPr id="68" name="直接连接符 67"/>
+          <p:cNvCxnSpPr/>
+          <p:nvPr/>
+        </p:nvCxnSpPr>
+        <p:spPr>
+          <a:xfrm rot="5400000" flipH="1" flipV="1">
+            <a:off x="214282" y="2000246"/>
+            <a:ext cx="285752" cy="1588"/>
+          </a:xfrm>
+          <a:prstGeom prst="line">
+            <a:avLst/>
+          </a:prstGeom>
+        </p:spPr>
+        <p:style>
+          <a:lnRef idx="1">
+            <a:schemeClr val="accent1"/>
+          </a:lnRef>
+          <a:fillRef idx="0">
+            <a:schemeClr val="accent1"/>
+          </a:fillRef>
+          <a:effectRef idx="0">
+            <a:schemeClr val="accent1"/>
+          </a:effectRef>
+          <a:fontRef idx="minor">
+            <a:schemeClr val="tx1"/>
+          </a:fontRef>
+        </p:style>
+      </p:cxnSp>
+      <p:cxnSp>
+        <p:nvCxnSpPr>
+          <p:cNvPr id="70" name="直接箭头连接符 69"/>
+          <p:cNvCxnSpPr/>
+          <p:nvPr/>
+        </p:nvCxnSpPr>
+        <p:spPr>
+          <a:xfrm>
+            <a:off x="357158" y="1857370"/>
+            <a:ext cx="214314" cy="1588"/>
+          </a:xfrm>
+          <a:prstGeom prst="straightConnector1">
+            <a:avLst/>
+          </a:prstGeom>
+          <a:ln>
+            <a:tailEnd type="arrow"/>
+          </a:ln>
+        </p:spPr>
+        <p:style>
+          <a:lnRef idx="1">
+            <a:schemeClr val="accent1"/>
+          </a:lnRef>
+          <a:fillRef idx="0">
+            <a:schemeClr val="accent1"/>
+          </a:fillRef>
+          <a:effectRef idx="0">
+            <a:schemeClr val="accent1"/>
+          </a:effectRef>
+          <a:fontRef idx="minor">
+            <a:schemeClr val="tx1"/>
+          </a:fontRef>
+        </p:style>
+      </p:cxnSp>
+      <p:cxnSp>
+        <p:nvCxnSpPr>
+          <p:cNvPr id="74" name="直接连接符 73"/>
+          <p:cNvCxnSpPr/>
+          <p:nvPr/>
+        </p:nvCxnSpPr>
+        <p:spPr>
+          <a:xfrm rot="5400000">
+            <a:off x="3272621" y="3614742"/>
+            <a:ext cx="284958" cy="794"/>
+          </a:xfrm>
+          <a:prstGeom prst="line">
+            <a:avLst/>
+          </a:prstGeom>
+        </p:spPr>
+        <p:style>
+          <a:lnRef idx="1">
+            <a:schemeClr val="accent1"/>
+          </a:lnRef>
+          <a:fillRef idx="0">
+            <a:schemeClr val="accent1"/>
+          </a:fillRef>
+          <a:effectRef idx="0">
+            <a:schemeClr val="accent1"/>
+          </a:effectRef>
+          <a:fontRef idx="minor">
+            <a:schemeClr val="tx1"/>
+          </a:fontRef>
+        </p:style>
+      </p:cxnSp>
+      <p:cxnSp>
+        <p:nvCxnSpPr>
+          <p:cNvPr id="81" name="直接连接符 80"/>
+          <p:cNvCxnSpPr/>
+          <p:nvPr/>
+        </p:nvCxnSpPr>
+        <p:spPr>
+          <a:xfrm rot="10800000">
+            <a:off x="207932" y="3760796"/>
+            <a:ext cx="3214710" cy="1588"/>
+          </a:xfrm>
+          <a:prstGeom prst="line">
+            <a:avLst/>
+          </a:prstGeom>
+        </p:spPr>
+        <p:style>
+          <a:lnRef idx="1">
+            <a:schemeClr val="accent1"/>
+          </a:lnRef>
+          <a:fillRef idx="0">
+            <a:schemeClr val="accent1"/>
+          </a:fillRef>
+          <a:effectRef idx="0">
+            <a:schemeClr val="accent1"/>
+          </a:effectRef>
+          <a:fontRef idx="minor">
+            <a:schemeClr val="tx1"/>
+          </a:fontRef>
+        </p:style>
+      </p:cxnSp>
+      <p:cxnSp>
+        <p:nvCxnSpPr>
+          <p:cNvPr id="83" name="直接连接符 82"/>
+          <p:cNvCxnSpPr/>
+          <p:nvPr/>
+        </p:nvCxnSpPr>
+        <p:spPr>
+          <a:xfrm rot="5400000" flipH="1" flipV="1">
+            <a:off x="-893007" y="2659857"/>
+            <a:ext cx="2214578" cy="1588"/>
+          </a:xfrm>
+          <a:prstGeom prst="line">
+            <a:avLst/>
+          </a:prstGeom>
+        </p:spPr>
+        <p:style>
+          <a:lnRef idx="1">
+            <a:schemeClr val="accent1"/>
+          </a:lnRef>
+          <a:fillRef idx="0">
+            <a:schemeClr val="accent1"/>
+          </a:fillRef>
+          <a:effectRef idx="0">
+            <a:schemeClr val="accent1"/>
+          </a:effectRef>
+          <a:fontRef idx="minor">
+            <a:schemeClr val="tx1"/>
+          </a:fontRef>
+        </p:style>
+      </p:cxnSp>
+      <p:cxnSp>
+        <p:nvCxnSpPr>
+          <p:cNvPr id="86" name="直接箭头连接符 85"/>
+          <p:cNvCxnSpPr/>
+          <p:nvPr/>
+        </p:nvCxnSpPr>
+        <p:spPr>
+          <a:xfrm>
+            <a:off x="214282" y="1571618"/>
+            <a:ext cx="357190" cy="1588"/>
+          </a:xfrm>
+          <a:prstGeom prst="straightConnector1">
+            <a:avLst/>
+          </a:prstGeom>
+          <a:ln>
+            <a:tailEnd type="arrow"/>
+          </a:ln>
+        </p:spPr>
+        <p:style>
+          <a:lnRef idx="1">
+            <a:schemeClr val="accent1"/>
+          </a:lnRef>
+          <a:fillRef idx="0">
+            <a:schemeClr val="accent1"/>
+          </a:fillRef>
+          <a:effectRef idx="0">
+            <a:schemeClr val="accent1"/>
+          </a:effectRef>
+          <a:fontRef idx="minor">
+            <a:schemeClr val="tx1"/>
+          </a:fontRef>
+        </p:style>
+      </p:cxnSp>
+      <p:sp>
+        <p:nvSpPr>
+          <p:cNvPr id="88" name="TextBox 87"/>
+          <p:cNvSpPr txBox="1"/>
+          <p:nvPr/>
+        </p:nvSpPr>
+        <p:spPr>
+          <a:xfrm>
+            <a:off x="500034" y="2143122"/>
+            <a:ext cx="449162" cy="246221"/>
+          </a:xfrm>
+          <a:prstGeom prst="rect">
+            <a:avLst/>
+          </a:prstGeom>
+          <a:noFill/>
+        </p:spPr>
+        <p:txBody>
+          <a:bodyPr wrap="none" rtlCol="0">
+            <a:spAutoFit/>
+          </a:bodyPr>
+          <a:lstStyle/>
+          <a:p>
+            <a:r>
+              <a:rPr lang="en-US" altLang="zh-CN" sz="1000" dirty="0" smtClean="0"/>
+              <a:t>PC+4</a:t>
+            </a:r>
+            <a:endParaRPr lang="zh-CN" altLang="en-US" sz="1000" dirty="0"/>
+          </a:p>
+        </p:txBody>
+      </p:sp>
+      <p:sp>
+        <p:nvSpPr>
+          <p:cNvPr id="89" name="TextBox 88"/>
+          <p:cNvSpPr txBox="1"/>
+          <p:nvPr/>
+        </p:nvSpPr>
+        <p:spPr>
+          <a:xfrm>
+            <a:off x="2432036" y="1536690"/>
+            <a:ext cx="1003801" cy="230832"/>
+          </a:xfrm>
+          <a:prstGeom prst="rect">
+            <a:avLst/>
+          </a:prstGeom>
+          <a:noFill/>
+        </p:spPr>
+        <p:txBody>
+          <a:bodyPr wrap="none" rtlCol="0">
+            <a:spAutoFit/>
+          </a:bodyPr>
+          <a:lstStyle/>
+          <a:p>
+            <a:r>
+              <a:rPr lang="en-US" altLang="zh-CN" sz="900" dirty="0" smtClean="0"/>
+              <a:t>(Branch Decoder)</a:t>
+            </a:r>
+            <a:endParaRPr lang="zh-CN" altLang="en-US" sz="900" dirty="0"/>
+          </a:p>
+        </p:txBody>
+      </p:sp>
+      <p:cxnSp>
+        <p:nvCxnSpPr>
+          <p:cNvPr id="92" name="直接连接符 91"/>
+          <p:cNvCxnSpPr>
+            <a:stCxn id="54" idx="0"/>
+          </p:cNvCxnSpPr>
+          <p:nvPr/>
+        </p:nvCxnSpPr>
+        <p:spPr>
+          <a:xfrm rot="16200000" flipV="1">
+            <a:off x="2502918" y="926056"/>
+            <a:ext cx="857256" cy="5239"/>
+          </a:xfrm>
+          <a:prstGeom prst="line">
+            <a:avLst/>
+          </a:prstGeom>
+        </p:spPr>
+        <p:style>
+          <a:lnRef idx="1">
+            <a:schemeClr val="accent1"/>
+          </a:lnRef>
+          <a:fillRef idx="0">
+            <a:schemeClr val="accent1"/>
+          </a:fillRef>
+          <a:effectRef idx="0">
+            <a:schemeClr val="accent1"/>
+          </a:effectRef>
+          <a:fontRef idx="minor">
+            <a:schemeClr val="tx1"/>
+          </a:fontRef>
+        </p:style>
+      </p:cxnSp>
+      <p:cxnSp>
+        <p:nvCxnSpPr>
+          <p:cNvPr id="95" name="直接连接符 94"/>
+          <p:cNvCxnSpPr/>
+          <p:nvPr/>
+        </p:nvCxnSpPr>
+        <p:spPr>
+          <a:xfrm rot="10800000">
+            <a:off x="714348" y="500048"/>
+            <a:ext cx="2214578" cy="1588"/>
+          </a:xfrm>
+          <a:prstGeom prst="line">
+            <a:avLst/>
+          </a:prstGeom>
+        </p:spPr>
+        <p:style>
+          <a:lnRef idx="1">
+            <a:schemeClr val="accent1"/>
+          </a:lnRef>
+          <a:fillRef idx="0">
+            <a:schemeClr val="accent1"/>
+          </a:fillRef>
+          <a:effectRef idx="0">
+            <a:schemeClr val="accent1"/>
+          </a:effectRef>
+          <a:fontRef idx="minor">
+            <a:schemeClr val="tx1"/>
+          </a:fontRef>
+        </p:style>
+      </p:cxnSp>
+      <p:cxnSp>
+        <p:nvCxnSpPr>
+          <p:cNvPr id="108" name="直接箭头连接符 107"/>
+          <p:cNvCxnSpPr>
+            <a:endCxn id="57" idx="0"/>
+          </p:cNvCxnSpPr>
+          <p:nvPr/>
+        </p:nvCxnSpPr>
+        <p:spPr>
+          <a:xfrm rot="5400000">
+            <a:off x="267861" y="910817"/>
+            <a:ext cx="857256" cy="35719"/>
+          </a:xfrm>
+          <a:prstGeom prst="straightConnector1">
+            <a:avLst/>
+          </a:prstGeom>
+          <a:ln>
+            <a:tailEnd type="arrow"/>
+          </a:ln>
+        </p:spPr>
+        <p:style>
+          <a:lnRef idx="1">
+            <a:schemeClr val="accent1"/>
+          </a:lnRef>
+          <a:fillRef idx="0">
+            <a:schemeClr val="accent1"/>
+          </a:fillRef>
+          <a:effectRef idx="0">
+            <a:schemeClr val="accent1"/>
+          </a:effectRef>
+          <a:fontRef idx="minor">
+            <a:schemeClr val="tx1"/>
+          </a:fontRef>
+        </p:style>
+      </p:cxnSp>
+      <p:sp>
+        <p:nvSpPr>
+          <p:cNvPr id="109" name="矩形 108"/>
+          <p:cNvSpPr/>
+          <p:nvPr/>
+        </p:nvSpPr>
+        <p:spPr>
+          <a:xfrm>
+            <a:off x="4143372" y="142858"/>
+            <a:ext cx="1643074" cy="362883"/>
+          </a:xfrm>
+          <a:prstGeom prst="rect">
+            <a:avLst/>
+          </a:prstGeom>
+        </p:spPr>
+        <p:style>
+          <a:lnRef idx="3">
+            <a:schemeClr val="lt1"/>
+          </a:lnRef>
+          <a:fillRef idx="1">
+            <a:schemeClr val="accent2"/>
+          </a:fillRef>
+          <a:effectRef idx="1">
+            <a:schemeClr val="accent2"/>
+          </a:effectRef>
+          <a:fontRef idx="minor">
+            <a:schemeClr val="lt1"/>
+          </a:fontRef>
+        </p:style>
+        <p:txBody>
+          <a:bodyPr rtlCol="0" anchor="ctr"/>
+          <a:lstStyle/>
+          <a:p>
+            <a:pPr algn="ctr"/>
+            <a:r>
+              <a:rPr lang="en-US" altLang="zh-CN" sz="1050" b="1" dirty="0" err="1" smtClean="0"/>
+              <a:t>riscv_pipe</a:t>
+            </a:r>
+            <a:r>
+              <a:rPr lang="en-US" altLang="zh-CN" sz="1050" b="1" dirty="0" smtClean="0"/>
+              <a:t> ctrl</a:t>
+            </a:r>
+            <a:endParaRPr lang="zh-CN" altLang="en-US" sz="1050" b="1" dirty="0"/>
+          </a:p>
+        </p:txBody>
+      </p:sp>
+      <p:sp>
+        <p:nvSpPr>
+          <p:cNvPr id="110" name="TextBox 109"/>
+          <p:cNvSpPr txBox="1"/>
+          <p:nvPr/>
+        </p:nvSpPr>
+        <p:spPr>
+          <a:xfrm>
+            <a:off x="214282" y="3500444"/>
+            <a:ext cx="747320" cy="246221"/>
+          </a:xfrm>
+          <a:prstGeom prst="rect">
+            <a:avLst/>
+          </a:prstGeom>
+          <a:noFill/>
+        </p:spPr>
+        <p:txBody>
+          <a:bodyPr wrap="none" rtlCol="0">
+            <a:spAutoFit/>
+          </a:bodyPr>
+          <a:lstStyle/>
+          <a:p>
+            <a:r>
+              <a:rPr lang="en-US" altLang="zh-CN" sz="1000" dirty="0" smtClean="0"/>
+              <a:t>PC+4+imm</a:t>
+            </a:r>
+            <a:endParaRPr lang="zh-CN" altLang="en-US" sz="1000" dirty="0"/>
+          </a:p>
+        </p:txBody>
+      </p:sp>
+      <p:sp>
+        <p:nvSpPr>
+          <p:cNvPr id="111" name="TextBox 110"/>
+          <p:cNvSpPr txBox="1"/>
+          <p:nvPr/>
+        </p:nvSpPr>
+        <p:spPr>
+          <a:xfrm>
+            <a:off x="5857884" y="214296"/>
+            <a:ext cx="1996059" cy="246221"/>
+          </a:xfrm>
+          <a:prstGeom prst="rect">
+            <a:avLst/>
+          </a:prstGeom>
+          <a:noFill/>
+        </p:spPr>
+        <p:txBody>
+          <a:bodyPr wrap="none" rtlCol="0">
+            <a:spAutoFit/>
+          </a:bodyPr>
+          <a:lstStyle/>
+          <a:p>
+            <a:r>
+              <a:rPr lang="en-US" altLang="zh-CN" sz="1000" dirty="0" smtClean="0"/>
+              <a:t>Solve the </a:t>
+            </a:r>
+            <a:r>
+              <a:rPr lang="en-US" altLang="zh-CN" sz="1000" dirty="0" smtClean="0"/>
+              <a:t>Read </a:t>
+            </a:r>
+            <a:r>
+              <a:rPr lang="en-US" altLang="zh-CN" sz="1000" dirty="0" smtClean="0"/>
+              <a:t>After Write Hazard</a:t>
+            </a:r>
+            <a:endParaRPr lang="zh-CN" altLang="en-US" sz="1000" dirty="0"/>
+          </a:p>
+        </p:txBody>
+      </p:sp>
     </p:spTree>
   </p:cSld>
   <p:clrMapOvr>

</xml_diff>